<commit_message>
minor PS_path_counting binomial.pptx bookkeeper-multinomial.pptx
</commit_message>
<xml_diff>
--- a/spring12/slidesS12/binomial.pptx
+++ b/spring12/slidesS12/binomial.pptx
@@ -5,10 +5,10 @@
     <p:sldMasterId id="2147483650" r:id="rId1"/>
   </p:sldMasterIdLst>
   <p:notesMasterIdLst>
-    <p:notesMasterId r:id="rId11"/>
+    <p:notesMasterId r:id="rId12"/>
   </p:notesMasterIdLst>
   <p:handoutMasterIdLst>
-    <p:handoutMasterId r:id="rId12"/>
+    <p:handoutMasterId r:id="rId13"/>
   </p:handoutMasterIdLst>
   <p:sldIdLst>
     <p:sldId id="524" r:id="rId2"/>
@@ -20,11 +20,12 @@
     <p:sldId id="545" r:id="rId8"/>
     <p:sldId id="546" r:id="rId9"/>
     <p:sldId id="547" r:id="rId10"/>
+    <p:sldId id="548" r:id="rId11"/>
   </p:sldIdLst>
   <p:sldSz cx="9144000" cy="6858000" type="screen4x3"/>
   <p:notesSz cx="9601200" cy="7315200"/>
   <p:custDataLst>
-    <p:tags r:id="rId14"/>
+    <p:tags r:id="rId15"/>
   </p:custDataLst>
   <p:defaultTextStyle>
     <a:defPPr>
@@ -907,6 +908,185 @@
           <a:p>
             <a:pPr eaLnBrk="1" hangingPunct="1"/>
             <a:endParaRPr lang="en-US" smtClean="0"/>
+          </a:p>
+        </p:txBody>
+      </p:sp>
+    </p:spTree>
+  </p:cSld>
+  <p:clrMapOvr>
+    <a:masterClrMapping/>
+  </p:clrMapOvr>
+</p:notes>
+</file>
+
+<file path=ppt/notesSlides/notesSlide10.xml><?xml version="1.0" encoding="utf-8"?>
+<p:notes xmlns:a="http://schemas.openxmlformats.org/drawingml/2006/main" xmlns:r="http://schemas.openxmlformats.org/officeDocument/2006/relationships" xmlns:p="http://schemas.openxmlformats.org/presentationml/2006/main">
+  <p:cSld>
+    <p:spTree>
+      <p:nvGrpSpPr>
+        <p:cNvPr id="1" name=""/>
+        <p:cNvGrpSpPr/>
+        <p:nvPr/>
+      </p:nvGrpSpPr>
+      <p:grpSpPr>
+        <a:xfrm>
+          <a:off x="0" y="0"/>
+          <a:ext cx="0" cy="0"/>
+          <a:chOff x="0" y="0"/>
+          <a:chExt cx="0" cy="0"/>
+        </a:xfrm>
+      </p:grpSpPr>
+      <p:sp>
+        <p:nvSpPr>
+          <p:cNvPr id="9" name="Rectangle 7"/>
+          <p:cNvSpPr>
+            <a:spLocks noGrp="1" noChangeArrowheads="1"/>
+          </p:cNvSpPr>
+          <p:nvPr>
+            <p:ph type="sldNum" sz="quarter" idx="5"/>
+          </p:nvPr>
+        </p:nvSpPr>
+        <p:spPr>
+          <a:ln/>
+        </p:spPr>
+        <p:txBody>
+          <a:bodyPr/>
+          <a:lstStyle/>
+          <a:p>
+            <a:pPr>
+              <a:defRPr/>
+            </a:pPr>
+            <a:r>
+              <a:rPr lang="en-US"/>
+              <a:t>‹#›</a:t>
+            </a:r>
+          </a:p>
+        </p:txBody>
+      </p:sp>
+      <p:sp>
+        <p:nvSpPr>
+          <p:cNvPr id="181250" name="Text Box 2"/>
+          <p:cNvSpPr txBox="1">
+            <a:spLocks noGrp="1" noChangeArrowheads="1"/>
+          </p:cNvSpPr>
+          <p:nvPr/>
+        </p:nvSpPr>
+        <p:spPr bwMode="auto">
+          <a:xfrm>
+            <a:off x="5442347" y="6949924"/>
+            <a:ext cx="4158853" cy="365276"/>
+          </a:xfrm>
+          <a:prstGeom prst="rect">
+            <a:avLst/>
+          </a:prstGeom>
+          <a:noFill/>
+          <a:ln w="9525">
+            <a:noFill/>
+            <a:miter lim="800000"/>
+            <a:headEnd/>
+            <a:tailEnd/>
+          </a:ln>
+        </p:spPr>
+        <p:txBody>
+          <a:bodyPr lIns="96660" tIns="48330" rIns="96660" bIns="48330" anchor="b"/>
+          <a:lstStyle/>
+          <a:p>
+            <a:pPr algn="r" defTabSz="966788" fontAlgn="base">
+              <a:spcBef>
+                <a:spcPct val="0"/>
+              </a:spcBef>
+              <a:spcAft>
+                <a:spcPct val="0"/>
+              </a:spcAft>
+            </a:pPr>
+            <a:r>
+              <a:rPr lang="en-US" sz="1300">
+                <a:latin typeface="Times New Roman" pitchFamily="18" charset="0"/>
+              </a:rPr>
+              <a:t>‹#›</a:t>
+            </a:r>
+          </a:p>
+        </p:txBody>
+      </p:sp>
+      <p:sp>
+        <p:nvSpPr>
+          <p:cNvPr id="181251" name="Text Box 3"/>
+          <p:cNvSpPr txBox="1">
+            <a:spLocks noGrp="1" noChangeArrowheads="1"/>
+          </p:cNvSpPr>
+          <p:nvPr/>
+        </p:nvSpPr>
+        <p:spPr bwMode="auto">
+          <a:xfrm>
+            <a:off x="5442347" y="6949924"/>
+            <a:ext cx="4158853" cy="365276"/>
+          </a:xfrm>
+          <a:prstGeom prst="rect">
+            <a:avLst/>
+          </a:prstGeom>
+          <a:noFill/>
+          <a:ln w="9525">
+            <a:noFill/>
+            <a:miter lim="800000"/>
+            <a:headEnd/>
+            <a:tailEnd/>
+          </a:ln>
+        </p:spPr>
+        <p:txBody>
+          <a:bodyPr lIns="96660" tIns="48330" rIns="96660" bIns="48330" anchor="b"/>
+          <a:lstStyle/>
+          <a:p>
+            <a:pPr algn="r" defTabSz="966788" fontAlgn="base">
+              <a:spcBef>
+                <a:spcPct val="0"/>
+              </a:spcBef>
+              <a:spcAft>
+                <a:spcPct val="0"/>
+              </a:spcAft>
+            </a:pPr>
+            <a:r>
+              <a:rPr lang="en-US" sz="1300">
+                <a:latin typeface="Times New Roman" pitchFamily="18" charset="0"/>
+              </a:rPr>
+              <a:t>9</a:t>
+            </a:r>
+          </a:p>
+        </p:txBody>
+      </p:sp>
+      <p:sp>
+        <p:nvSpPr>
+          <p:cNvPr id="181252" name="Rectangle 4"/>
+          <p:cNvSpPr>
+            <a:spLocks noGrp="1" noRot="1" noChangeAspect="1" noChangeArrowheads="1" noTextEdit="1"/>
+          </p:cNvSpPr>
+          <p:nvPr>
+            <p:ph type="sldImg"/>
+          </p:nvPr>
+        </p:nvSpPr>
+        <p:spPr>
+          <a:ln/>
+        </p:spPr>
+      </p:sp>
+      <p:sp>
+        <p:nvSpPr>
+          <p:cNvPr id="7173" name="Rectangle 5"/>
+          <p:cNvSpPr>
+            <a:spLocks noGrp="1" noChangeArrowheads="1"/>
+          </p:cNvSpPr>
+          <p:nvPr>
+            <p:ph type="body" idx="1"/>
+          </p:nvPr>
+        </p:nvSpPr>
+        <p:spPr>
+          <a:noFill/>
+          <a:ln/>
+        </p:spPr>
+        <p:txBody>
+          <a:bodyPr/>
+          <a:lstStyle/>
+          <a:p>
+            <a:pPr eaLnBrk="1" hangingPunct="1"/>
+            <a:endParaRPr lang="en-US"/>
           </a:p>
         </p:txBody>
       </p:sp>
@@ -3767,6 +3947,419 @@
 </p:sld>
 </file>
 
+<file path=ppt/slides/slide10.xml><?xml version="1.0" encoding="utf-8"?>
+<p:sld xmlns:a="http://schemas.openxmlformats.org/drawingml/2006/main" xmlns:r="http://schemas.openxmlformats.org/officeDocument/2006/relationships" xmlns:p="http://schemas.openxmlformats.org/presentationml/2006/main" show="0">
+  <p:cSld>
+    <p:spTree>
+      <p:nvGrpSpPr>
+        <p:cNvPr id="1" name=""/>
+        <p:cNvGrpSpPr/>
+        <p:nvPr/>
+      </p:nvGrpSpPr>
+      <p:grpSpPr>
+        <a:xfrm>
+          <a:off x="0" y="0"/>
+          <a:ext cx="0" cy="0"/>
+          <a:chOff x="0" y="0"/>
+          <a:chExt cx="0" cy="0"/>
+        </a:xfrm>
+      </p:grpSpPr>
+      <p:graphicFrame>
+        <p:nvGraphicFramePr>
+          <p:cNvPr id="6146" name="Object 10"/>
+          <p:cNvGraphicFramePr>
+            <a:graphicFrameLocks noChangeAspect="1"/>
+          </p:cNvGraphicFramePr>
+          <p:nvPr>
+            <p:extLst>
+              <p:ext uri="{D42A27DB-BD31-4B8C-83A1-F6EECF244321}">
+                <p14:modId xmlns:p14="http://schemas.microsoft.com/office/powerpoint/2010/main" val="773896323"/>
+              </p:ext>
+            </p:extLst>
+          </p:nvPr>
+        </p:nvGraphicFramePr>
+        <p:xfrm>
+          <a:off x="95250" y="2079625"/>
+          <a:ext cx="8924925" cy="2703513"/>
+        </p:xfrm>
+        <a:graphic>
+          <a:graphicData uri="http://schemas.openxmlformats.org/presentationml/2006/ole">
+            <mc:AlternateContent xmlns:mc="http://schemas.openxmlformats.org/markup-compatibility/2006">
+              <mc:Choice xmlns:v="urn:schemas-microsoft-com:vml" Requires="v">
+                <p:oleObj spid="_x0000_s132103" name="Equation" r:id="rId4" imgW="1676400" imgH="508000" progId="Equation.DSMT4">
+                  <p:embed/>
+                </p:oleObj>
+              </mc:Choice>
+              <mc:Fallback>
+                <p:oleObj name="Equation" r:id="rId4" imgW="1676400" imgH="508000" progId="Equation.DSMT4">
+                  <p:embed/>
+                  <p:pic>
+                    <p:nvPicPr>
+                      <p:cNvPr id="0" name=""/>
+                      <p:cNvPicPr>
+                        <a:picLocks noChangeAspect="1" noChangeArrowheads="1"/>
+                      </p:cNvPicPr>
+                      <p:nvPr/>
+                    </p:nvPicPr>
+                    <p:blipFill>
+                      <a:blip r:embed="rId5"/>
+                      <a:srcRect/>
+                      <a:stretch>
+                        <a:fillRect/>
+                      </a:stretch>
+                    </p:blipFill>
+                    <p:spPr bwMode="invGray">
+                      <a:xfrm>
+                        <a:off x="95250" y="2079625"/>
+                        <a:ext cx="8924925" cy="2703513"/>
+                      </a:xfrm>
+                      <a:prstGeom prst="rect">
+                        <a:avLst/>
+                      </a:prstGeom>
+                      <a:noFill/>
+                      <a:ln w="38100">
+                        <a:solidFill>
+                          <a:srgbClr val="0000FF"/>
+                        </a:solidFill>
+                        <a:miter lim="800000"/>
+                        <a:headEnd/>
+                        <a:tailEnd/>
+                      </a:ln>
+                      <a:extLst>
+                        <a:ext uri="{909E8E84-426E-40dd-AFC4-6F175D3DCCD1}">
+                          <a14:hiddenFill xmlns:a14="http://schemas.microsoft.com/office/drawing/2010/main">
+                            <a:solidFill>
+                              <a:srgbClr val="FFFFFF"/>
+                            </a:solidFill>
+                          </a14:hiddenFill>
+                        </a:ext>
+                      </a:extLst>
+                    </p:spPr>
+                  </p:pic>
+                </p:oleObj>
+              </mc:Fallback>
+            </mc:AlternateContent>
+          </a:graphicData>
+        </a:graphic>
+      </p:graphicFrame>
+      <p:sp>
+        <p:nvSpPr>
+          <p:cNvPr id="5" name="Slide Number Placeholder 4"/>
+          <p:cNvSpPr>
+            <a:spLocks noGrp="1"/>
+          </p:cNvSpPr>
+          <p:nvPr>
+            <p:ph type="sldNum" sz="quarter" idx="10"/>
+          </p:nvPr>
+        </p:nvSpPr>
+        <p:spPr>
+          <a:xfrm>
+            <a:off x="6400800" y="6613525"/>
+            <a:ext cx="2667000" cy="261938"/>
+          </a:xfrm>
+          <a:noFill/>
+        </p:spPr>
+        <p:txBody>
+          <a:bodyPr/>
+          <a:lstStyle/>
+          <a:p>
+            <a:r>
+              <a:rPr lang="en-US" dirty="0" err="1" smtClean="0"/>
+              <a:t>lec</a:t>
+            </a:r>
+            <a:r>
+              <a:rPr lang="en-US" dirty="0" smtClean="0"/>
+              <a:t> 10W.</a:t>
+            </a:r>
+            <a:fld id="{67B4AFCC-5E15-4E97-9BE8-9E5193C2354C}" type="slidenum">
+              <a:rPr lang="en-US" smtClean="0"/>
+              <a:pPr/>
+              <a:t>10</a:t>
+            </a:fld>
+            <a:endParaRPr lang="en-US" dirty="0" smtClean="0"/>
+          </a:p>
+        </p:txBody>
+      </p:sp>
+      <p:sp>
+        <p:nvSpPr>
+          <p:cNvPr id="6" name="Rectangle 6"/>
+          <p:cNvSpPr txBox="1">
+            <a:spLocks noChangeArrowheads="1"/>
+          </p:cNvSpPr>
+          <p:nvPr/>
+        </p:nvSpPr>
+        <p:spPr bwMode="auto">
+          <a:xfrm>
+            <a:off x="1600200" y="304800"/>
+            <a:ext cx="7543800" cy="1143000"/>
+          </a:xfrm>
+          <a:prstGeom prst="rect">
+            <a:avLst/>
+          </a:prstGeom>
+          <a:noFill/>
+          <a:ln w="9525">
+            <a:noFill/>
+            <a:miter lim="800000"/>
+            <a:headEnd/>
+            <a:tailEnd/>
+          </a:ln>
+        </p:spPr>
+        <p:txBody>
+          <a:bodyPr vert="horz" wrap="square" lIns="91440" tIns="45720" rIns="91440" bIns="45720" numCol="1" anchor="ctr" anchorCtr="0" compatLnSpc="1">
+            <a:prstTxWarp prst="textNoShape">
+              <a:avLst/>
+            </a:prstTxWarp>
+          </a:bodyPr>
+          <a:lstStyle>
+            <a:lvl1pPr algn="l" rtl="0" eaLnBrk="0" fontAlgn="base" hangingPunct="0">
+              <a:spcBef>
+                <a:spcPct val="0"/>
+              </a:spcBef>
+              <a:spcAft>
+                <a:spcPct val="0"/>
+              </a:spcAft>
+              <a:defRPr sz="4000" b="1">
+                <a:solidFill>
+                  <a:schemeClr val="tx2"/>
+                </a:solidFill>
+                <a:latin typeface="Comic Sans MS" pitchFamily="66" charset="0"/>
+                <a:ea typeface="+mj-ea"/>
+                <a:cs typeface="+mj-cs"/>
+              </a:defRPr>
+            </a:lvl1pPr>
+            <a:lvl2pPr algn="l" rtl="0" eaLnBrk="0" fontAlgn="base" hangingPunct="0">
+              <a:spcBef>
+                <a:spcPct val="0"/>
+              </a:spcBef>
+              <a:spcAft>
+                <a:spcPct val="0"/>
+              </a:spcAft>
+              <a:defRPr sz="4000" b="1">
+                <a:solidFill>
+                  <a:schemeClr val="tx2"/>
+                </a:solidFill>
+                <a:latin typeface="Times New Roman" pitchFamily="8" charset="0"/>
+              </a:defRPr>
+            </a:lvl2pPr>
+            <a:lvl3pPr algn="l" rtl="0" eaLnBrk="0" fontAlgn="base" hangingPunct="0">
+              <a:spcBef>
+                <a:spcPct val="0"/>
+              </a:spcBef>
+              <a:spcAft>
+                <a:spcPct val="0"/>
+              </a:spcAft>
+              <a:defRPr sz="4000" b="1">
+                <a:solidFill>
+                  <a:schemeClr val="tx2"/>
+                </a:solidFill>
+                <a:latin typeface="Times New Roman" pitchFamily="8" charset="0"/>
+              </a:defRPr>
+            </a:lvl3pPr>
+            <a:lvl4pPr algn="l" rtl="0" eaLnBrk="0" fontAlgn="base" hangingPunct="0">
+              <a:spcBef>
+                <a:spcPct val="0"/>
+              </a:spcBef>
+              <a:spcAft>
+                <a:spcPct val="0"/>
+              </a:spcAft>
+              <a:defRPr sz="4000" b="1">
+                <a:solidFill>
+                  <a:schemeClr val="tx2"/>
+                </a:solidFill>
+                <a:latin typeface="Times New Roman" pitchFamily="8" charset="0"/>
+              </a:defRPr>
+            </a:lvl4pPr>
+            <a:lvl5pPr algn="l" rtl="0" eaLnBrk="0" fontAlgn="base" hangingPunct="0">
+              <a:spcBef>
+                <a:spcPct val="0"/>
+              </a:spcBef>
+              <a:spcAft>
+                <a:spcPct val="0"/>
+              </a:spcAft>
+              <a:defRPr sz="4000" b="1">
+                <a:solidFill>
+                  <a:schemeClr val="tx2"/>
+                </a:solidFill>
+                <a:latin typeface="Times New Roman" pitchFamily="8" charset="0"/>
+              </a:defRPr>
+            </a:lvl5pPr>
+            <a:lvl6pPr marL="457200" algn="l" rtl="0" fontAlgn="base">
+              <a:spcBef>
+                <a:spcPct val="0"/>
+              </a:spcBef>
+              <a:spcAft>
+                <a:spcPct val="0"/>
+              </a:spcAft>
+              <a:defRPr sz="4000" b="1">
+                <a:solidFill>
+                  <a:schemeClr val="tx2"/>
+                </a:solidFill>
+                <a:latin typeface="Times New Roman" pitchFamily="8" charset="0"/>
+              </a:defRPr>
+            </a:lvl6pPr>
+            <a:lvl7pPr marL="914400" algn="l" rtl="0" fontAlgn="base">
+              <a:spcBef>
+                <a:spcPct val="0"/>
+              </a:spcBef>
+              <a:spcAft>
+                <a:spcPct val="0"/>
+              </a:spcAft>
+              <a:defRPr sz="4000" b="1">
+                <a:solidFill>
+                  <a:schemeClr val="tx2"/>
+                </a:solidFill>
+                <a:latin typeface="Times New Roman" pitchFamily="8" charset="0"/>
+              </a:defRPr>
+            </a:lvl7pPr>
+            <a:lvl8pPr marL="1371600" algn="l" rtl="0" fontAlgn="base">
+              <a:spcBef>
+                <a:spcPct val="0"/>
+              </a:spcBef>
+              <a:spcAft>
+                <a:spcPct val="0"/>
+              </a:spcAft>
+              <a:defRPr sz="4000" b="1">
+                <a:solidFill>
+                  <a:schemeClr val="tx2"/>
+                </a:solidFill>
+                <a:latin typeface="Times New Roman" pitchFamily="8" charset="0"/>
+              </a:defRPr>
+            </a:lvl8pPr>
+            <a:lvl9pPr marL="1828800" algn="l" rtl="0" fontAlgn="base">
+              <a:spcBef>
+                <a:spcPct val="0"/>
+              </a:spcBef>
+              <a:spcAft>
+                <a:spcPct val="0"/>
+              </a:spcAft>
+              <a:defRPr sz="4000" b="1">
+                <a:solidFill>
+                  <a:schemeClr val="tx2"/>
+                </a:solidFill>
+                <a:latin typeface="Times New Roman" pitchFamily="8" charset="0"/>
+              </a:defRPr>
+            </a:lvl9pPr>
+          </a:lstStyle>
+          <a:p>
+            <a:pPr eaLnBrk="1" hangingPunct="1"/>
+            <a:r>
+              <a:rPr lang="en-US" smtClean="0">
+                <a:solidFill>
+                  <a:schemeClr val="tx1"/>
+                </a:solidFill>
+              </a:rPr>
+              <a:t>The Binomial Formula</a:t>
+            </a:r>
+            <a:endParaRPr lang="en-US" dirty="0">
+              <a:solidFill>
+                <a:schemeClr val="tx1"/>
+              </a:solidFill>
+            </a:endParaRPr>
+          </a:p>
+        </p:txBody>
+      </p:sp>
+    </p:spTree>
+    <p:extLst>
+      <p:ext uri="{BB962C8B-B14F-4D97-AF65-F5344CB8AC3E}">
+        <p14:creationId xmlns:p14="http://schemas.microsoft.com/office/powerpoint/2010/main" val="1270750096"/>
+      </p:ext>
+    </p:extLst>
+  </p:cSld>
+  <p:clrMapOvr>
+    <a:masterClrMapping/>
+  </p:clrMapOvr>
+  <p:transition xmlns:p14="http://schemas.microsoft.com/office/powerpoint/2010/main" spd="med">
+    <p:fade/>
+  </p:transition>
+  <p:timing>
+    <p:tnLst>
+      <p:par>
+        <p:cTn xmlns:p14="http://schemas.microsoft.com/office/powerpoint/2010/main" id="1" dur="indefinite" restart="never" nodeType="tmRoot">
+          <p:childTnLst>
+            <p:seq concurrent="1" nextAc="seek">
+              <p:cTn id="2" dur="indefinite" nodeType="mainSeq">
+                <p:childTnLst>
+                  <p:par>
+                    <p:cTn id="3" fill="hold">
+                      <p:stCondLst>
+                        <p:cond delay="indefinite"/>
+                        <p:cond evt="onBegin" delay="0">
+                          <p:tn val="2"/>
+                        </p:cond>
+                      </p:stCondLst>
+                      <p:childTnLst>
+                        <p:par>
+                          <p:cTn id="4" fill="hold">
+                            <p:stCondLst>
+                              <p:cond delay="0"/>
+                            </p:stCondLst>
+                            <p:childTnLst>
+                              <p:par>
+                                <p:cTn id="5" presetID="22" presetClass="entr" presetSubtype="8" fill="hold" nodeType="withEffect">
+                                  <p:stCondLst>
+                                    <p:cond delay="0"/>
+                                  </p:stCondLst>
+                                  <p:childTnLst>
+                                    <p:set>
+                                      <p:cBhvr>
+                                        <p:cTn id="6" dur="1" fill="hold">
+                                          <p:stCondLst>
+                                            <p:cond delay="0"/>
+                                          </p:stCondLst>
+                                        </p:cTn>
+                                        <p:tgtEl>
+                                          <p:spTgt spid="6146"/>
+                                        </p:tgtEl>
+                                        <p:attrNameLst>
+                                          <p:attrName>style.visibility</p:attrName>
+                                        </p:attrNameLst>
+                                      </p:cBhvr>
+                                      <p:to>
+                                        <p:strVal val="visible"/>
+                                      </p:to>
+                                    </p:set>
+                                    <p:animEffect transition="in" filter="wipe(left)">
+                                      <p:cBhvr>
+                                        <p:cTn id="7" dur="500"/>
+                                        <p:tgtEl>
+                                          <p:spTgt spid="6146"/>
+                                        </p:tgtEl>
+                                      </p:cBhvr>
+                                    </p:animEffect>
+                                  </p:childTnLst>
+                                </p:cTn>
+                              </p:par>
+                            </p:childTnLst>
+                          </p:cTn>
+                        </p:par>
+                      </p:childTnLst>
+                    </p:cTn>
+                  </p:par>
+                </p:childTnLst>
+              </p:cTn>
+              <p:prevCondLst>
+                <p:cond evt="onPrev" delay="0">
+                  <p:tgtEl>
+                    <p:sldTgt/>
+                  </p:tgtEl>
+                </p:cond>
+              </p:prevCondLst>
+              <p:nextCondLst>
+                <p:cond evt="onNext" delay="0">
+                  <p:tgtEl>
+                    <p:sldTgt/>
+                  </p:tgtEl>
+                </p:cond>
+              </p:nextCondLst>
+            </p:seq>
+          </p:childTnLst>
+        </p:cTn>
+      </p:par>
+    </p:tnLst>
+  </p:timing>
+</p:sld>
+</file>
+
 <file path=ppt/slides/slide2.xml><?xml version="1.0" encoding="utf-8"?>
 <p:sld xmlns:a="http://schemas.openxmlformats.org/drawingml/2006/main" xmlns:r="http://schemas.openxmlformats.org/officeDocument/2006/relationships" xmlns:p="http://schemas.openxmlformats.org/presentationml/2006/main">
   <p:cSld>
@@ -17852,7 +18445,7 @@
           <a:graphicData uri="http://schemas.openxmlformats.org/presentationml/2006/ole">
             <mc:AlternateContent xmlns:mc="http://schemas.openxmlformats.org/markup-compatibility/2006">
               <mc:Choice xmlns:v="urn:schemas-microsoft-com:vml" Requires="v">
-                <p:oleObj spid="_x0000_s1034" name="Equation" r:id="rId4" imgW="1866600" imgH="482400" progId="Equation.3">
+                <p:oleObj spid="_x0000_s1044" name="Equation" r:id="rId4" imgW="1866600" imgH="482400" progId="Equation.3">
                   <p:embed/>
                 </p:oleObj>
               </mc:Choice>
@@ -19158,7 +19751,7 @@
           <a:graphicData uri="http://schemas.openxmlformats.org/presentationml/2006/ole">
             <mc:AlternateContent xmlns:mc="http://schemas.openxmlformats.org/markup-compatibility/2006">
               <mc:Choice xmlns:v="urn:schemas-microsoft-com:vml" Requires="v">
-                <p:oleObj spid="_x0000_s127000" name="Equation" r:id="rId4" imgW="428207" imgH="666100" progId="Equation.DSMT4">
+                <p:oleObj spid="_x0000_s127016" name="Equation" r:id="rId4" imgW="428207" imgH="666100" progId="Equation.DSMT4">
                   <p:embed/>
                 </p:oleObj>
               </mc:Choice>
@@ -19234,7 +19827,7 @@
           <a:graphicData uri="http://schemas.openxmlformats.org/presentationml/2006/ole">
             <mc:AlternateContent xmlns:mc="http://schemas.openxmlformats.org/markup-compatibility/2006">
               <mc:Choice xmlns:v="urn:schemas-microsoft-com:vml" Requires="v">
-                <p:oleObj spid="_x0000_s127001" name="Equation" r:id="rId6" imgW="2374560" imgH="469800" progId="Equation.3">
+                <p:oleObj spid="_x0000_s127017" name="Equation" r:id="rId6" imgW="2374560" imgH="469800" progId="Equation.3">
                   <p:embed/>
                 </p:oleObj>
               </mc:Choice>
@@ -19986,7 +20579,7 @@
           <a:graphicData uri="http://schemas.openxmlformats.org/presentationml/2006/ole">
             <mc:AlternateContent xmlns:mc="http://schemas.openxmlformats.org/markup-compatibility/2006">
               <mc:Choice xmlns:v="urn:schemas-microsoft-com:vml" Requires="v">
-                <p:oleObj spid="_x0000_s128022" name="Equation" r:id="rId4" imgW="533160" imgH="457200" progId="Equation.DSMT4">
+                <p:oleObj spid="_x0000_s128038" name="Equation" r:id="rId4" imgW="533160" imgH="457200" progId="Equation.DSMT4">
                   <p:embed/>
                 </p:oleObj>
               </mc:Choice>
@@ -20056,7 +20649,7 @@
           <a:graphicData uri="http://schemas.openxmlformats.org/presentationml/2006/ole">
             <mc:AlternateContent xmlns:mc="http://schemas.openxmlformats.org/markup-compatibility/2006">
               <mc:Choice xmlns:v="urn:schemas-microsoft-com:vml" Requires="v">
-                <p:oleObj spid="_x0000_s128023" name="Equation" r:id="rId6" imgW="2374560" imgH="469800" progId="Equation.3">
+                <p:oleObj spid="_x0000_s128039" name="Equation" r:id="rId6" imgW="2374560" imgH="469800" progId="Equation.3">
                   <p:embed/>
                 </p:oleObj>
               </mc:Choice>
@@ -20712,7 +21305,7 @@
           <a:graphicData uri="http://schemas.openxmlformats.org/presentationml/2006/ole">
             <mc:AlternateContent xmlns:mc="http://schemas.openxmlformats.org/markup-compatibility/2006">
               <mc:Choice xmlns:v="urn:schemas-microsoft-com:vml" Requires="v">
-                <p:oleObj spid="_x0000_s129046" name="Equation" r:id="rId4" imgW="2920680" imgH="507960" progId="Equation.DSMT4">
+                <p:oleObj spid="_x0000_s129062" name="Equation" r:id="rId4" imgW="2920680" imgH="507960" progId="Equation.DSMT4">
                   <p:embed/>
                 </p:oleObj>
               </mc:Choice>
@@ -21076,7 +21669,7 @@
           <a:graphicData uri="http://schemas.openxmlformats.org/presentationml/2006/ole">
             <mc:AlternateContent xmlns:mc="http://schemas.openxmlformats.org/markup-compatibility/2006">
               <mc:Choice xmlns:v="urn:schemas-microsoft-com:vml" Requires="v">
-                <p:oleObj spid="_x0000_s129047" name="Equation" r:id="rId6" imgW="660240" imgH="241200" progId="Equation.3">
+                <p:oleObj spid="_x0000_s129063" name="Equation" r:id="rId6" imgW="660240" imgH="241200" progId="Equation.3">
                   <p:embed/>
                 </p:oleObj>
               </mc:Choice>
@@ -21388,7 +21981,7 @@
           <a:graphicData uri="http://schemas.openxmlformats.org/presentationml/2006/ole">
             <mc:AlternateContent xmlns:mc="http://schemas.openxmlformats.org/markup-compatibility/2006">
               <mc:Choice xmlns:v="urn:schemas-microsoft-com:vml" Requires="v">
-                <p:oleObj spid="_x0000_s130070" name="Equation" r:id="rId4" imgW="2273040" imgH="990360" progId="Equation.DSMT4">
+                <p:oleObj spid="_x0000_s130086" name="Equation" r:id="rId4" imgW="2273040" imgH="990360" progId="Equation.DSMT4">
                   <p:embed/>
                 </p:oleObj>
               </mc:Choice>
@@ -21458,7 +22051,7 @@
           <a:graphicData uri="http://schemas.openxmlformats.org/presentationml/2006/ole">
             <mc:AlternateContent xmlns:mc="http://schemas.openxmlformats.org/markup-compatibility/2006">
               <mc:Choice xmlns:v="urn:schemas-microsoft-com:vml" Requires="v">
-                <p:oleObj spid="_x0000_s130071" name="Equation" r:id="rId6" imgW="685800" imgH="241200" progId="Equation.3">
+                <p:oleObj spid="_x0000_s130087" name="Equation" r:id="rId6" imgW="685800" imgH="241200" progId="Equation.3">
                   <p:embed/>
                 </p:oleObj>
               </mc:Choice>
@@ -21666,84 +22259,6 @@
           <a:chExt cx="0" cy="0"/>
         </a:xfrm>
       </p:grpSpPr>
-      <p:graphicFrame>
-        <p:nvGraphicFramePr>
-          <p:cNvPr id="6146" name="Object 10"/>
-          <p:cNvGraphicFramePr>
-            <a:graphicFrameLocks noChangeAspect="1"/>
-          </p:cNvGraphicFramePr>
-          <p:nvPr/>
-        </p:nvGraphicFramePr>
-        <p:xfrm>
-          <a:off x="500063" y="2214563"/>
-          <a:ext cx="8113712" cy="2433637"/>
-        </p:xfrm>
-        <a:graphic>
-          <a:graphicData uri="http://schemas.openxmlformats.org/presentationml/2006/ole">
-            <mc:AlternateContent xmlns:mc="http://schemas.openxmlformats.org/markup-compatibility/2006">
-              <mc:Choice xmlns:v="urn:schemas-microsoft-com:vml" Requires="v">
-                <p:oleObj spid="_x0000_s131085" name="Equation" r:id="rId4" imgW="1523880" imgH="457200" progId="Equation.3">
-                  <p:embed/>
-                </p:oleObj>
-              </mc:Choice>
-              <mc:Fallback>
-                <p:oleObj name="Equation" r:id="rId4" imgW="1523880" imgH="457200" progId="Equation.3">
-                  <p:embed/>
-                  <p:pic>
-                    <p:nvPicPr>
-                      <p:cNvPr id="0" name=""/>
-                      <p:cNvPicPr>
-                        <a:picLocks noChangeAspect="1" noChangeArrowheads="1"/>
-                      </p:cNvPicPr>
-                      <p:nvPr/>
-                    </p:nvPicPr>
-                    <p:blipFill>
-                      <a:blip r:embed="rId5">
-                        <a:extLst>
-                          <a:ext uri="{28A0092B-C50C-407E-A947-70E740481C1C}">
-                            <a14:useLocalDpi xmlns:a14="http://schemas.microsoft.com/office/drawing/2010/main" val="0"/>
-                          </a:ext>
-                        </a:extLst>
-                      </a:blip>
-                      <a:srcRect/>
-                      <a:stretch>
-                        <a:fillRect/>
-                      </a:stretch>
-                    </p:blipFill>
-                    <p:spPr bwMode="invGray">
-                      <a:xfrm>
-                        <a:off x="500063" y="2214563"/>
-                        <a:ext cx="8113712" cy="2433637"/>
-                      </a:xfrm>
-                      <a:prstGeom prst="rect">
-                        <a:avLst/>
-                      </a:prstGeom>
-                      <a:noFill/>
-                      <a:ln w="38100">
-                        <a:solidFill>
-                          <a:srgbClr val="0000FF"/>
-                        </a:solidFill>
-                        <a:miter lim="800000"/>
-                        <a:headEnd/>
-                        <a:tailEnd/>
-                      </a:ln>
-                      <a:extLst>
-                        <a:ext uri="{909E8E84-426E-40dd-AFC4-6F175D3DCCD1}">
-                          <a14:hiddenFill xmlns:a14="http://schemas.microsoft.com/office/drawing/2010/main">
-                            <a:solidFill>
-                              <a:srgbClr val="FFFFFF"/>
-                            </a:solidFill>
-                          </a14:hiddenFill>
-                        </a:ext>
-                      </a:extLst>
-                    </p:spPr>
-                  </p:pic>
-                </p:oleObj>
-              </mc:Fallback>
-            </mc:AlternateContent>
-          </a:graphicData>
-        </a:graphic>
-      </p:graphicFrame>
       <p:sp>
         <p:nvSpPr>
           <p:cNvPr id="5" name="Slide Number Placeholder 4"/>
@@ -21945,7 +22460,7 @@
           <a:p>
             <a:pPr eaLnBrk="1" hangingPunct="1"/>
             <a:r>
-              <a:rPr lang="en-US" smtClean="0">
+              <a:rPr lang="en-US" dirty="0" smtClean="0">
                 <a:solidFill>
                   <a:schemeClr val="tx1"/>
                 </a:solidFill>
@@ -21956,6 +22471,126 @@
               <a:solidFill>
                 <a:schemeClr val="tx1"/>
               </a:solidFill>
+            </a:endParaRPr>
+          </a:p>
+        </p:txBody>
+      </p:sp>
+      <p:graphicFrame>
+        <p:nvGraphicFramePr>
+          <p:cNvPr id="4" name="Object 3"/>
+          <p:cNvGraphicFramePr>
+            <a:graphicFrameLocks noChangeAspect="1"/>
+          </p:cNvGraphicFramePr>
+          <p:nvPr>
+            <p:extLst>
+              <p:ext uri="{D42A27DB-BD31-4B8C-83A1-F6EECF244321}">
+                <p14:modId xmlns:p14="http://schemas.microsoft.com/office/powerpoint/2010/main" val="205430510"/>
+              </p:ext>
+            </p:extLst>
+          </p:nvPr>
+        </p:nvGraphicFramePr>
+        <p:xfrm>
+          <a:off x="627232" y="2238480"/>
+          <a:ext cx="7857432" cy="2381040"/>
+        </p:xfrm>
+        <a:graphic>
+          <a:graphicData uri="http://schemas.openxmlformats.org/presentationml/2006/ole">
+            <mc:AlternateContent xmlns:mc="http://schemas.openxmlformats.org/markup-compatibility/2006">
+              <mc:Choice xmlns:v="urn:schemas-microsoft-com:vml" Requires="v">
+                <p:oleObj spid="_x0000_s133124" name="Equation" r:id="rId4" imgW="1676400" imgH="508000" progId="Equation.DSMT4">
+                  <p:embed/>
+                </p:oleObj>
+              </mc:Choice>
+              <mc:Fallback>
+                <p:oleObj name="Equation" r:id="rId4" imgW="1676400" imgH="508000" progId="Equation.DSMT4">
+                  <p:embed/>
+                  <p:pic>
+                    <p:nvPicPr>
+                      <p:cNvPr id="0" name=""/>
+                      <p:cNvPicPr/>
+                      <p:nvPr/>
+                    </p:nvPicPr>
+                    <p:blipFill>
+                      <a:blip r:embed="rId5"/>
+                      <a:stretch>
+                        <a:fillRect/>
+                      </a:stretch>
+                    </p:blipFill>
+                    <p:spPr>
+                      <a:xfrm>
+                        <a:off x="627232" y="2238480"/>
+                        <a:ext cx="7857432" cy="2381040"/>
+                      </a:xfrm>
+                      <a:prstGeom prst="rect">
+                        <a:avLst/>
+                      </a:prstGeom>
+                    </p:spPr>
+                  </p:pic>
+                </p:oleObj>
+              </mc:Fallback>
+            </mc:AlternateContent>
+          </a:graphicData>
+        </a:graphic>
+      </p:graphicFrame>
+      <p:sp>
+        <p:nvSpPr>
+          <p:cNvPr id="2" name="Rectangle 1"/>
+          <p:cNvSpPr/>
+          <p:nvPr/>
+        </p:nvSpPr>
+        <p:spPr bwMode="auto">
+          <a:xfrm>
+            <a:off x="389353" y="2160067"/>
+            <a:ext cx="8491602" cy="2438194"/>
+          </a:xfrm>
+          <a:prstGeom prst="rect">
+            <a:avLst/>
+          </a:prstGeom>
+          <a:noFill/>
+          <a:ln w="38100" cap="flat" cmpd="sng" algn="ctr">
+            <a:solidFill>
+              <a:srgbClr val="FF00FF"/>
+            </a:solidFill>
+            <a:prstDash val="sysDash"/>
+            <a:round/>
+            <a:headEnd type="none" w="med" len="med"/>
+            <a:tailEnd type="none" w="med" len="med"/>
+          </a:ln>
+          <a:effectLst/>
+        </p:spPr>
+        <p:txBody>
+          <a:bodyPr vert="horz" wrap="square" lIns="91440" tIns="45720" rIns="91440" bIns="45720" numCol="1" rtlCol="0" anchor="t" anchorCtr="0" compatLnSpc="1">
+            <a:prstTxWarp prst="textNoShape">
+              <a:avLst/>
+            </a:prstTxWarp>
+          </a:bodyPr>
+          <a:lstStyle/>
+          <a:p>
+            <a:pPr marL="0" marR="0" indent="0" algn="l" defTabSz="914400" rtl="0" eaLnBrk="1" fontAlgn="base" latinLnBrk="0" hangingPunct="1">
+              <a:lnSpc>
+                <a:spcPct val="100000"/>
+              </a:lnSpc>
+              <a:spcBef>
+                <a:spcPct val="0"/>
+              </a:spcBef>
+              <a:spcAft>
+                <a:spcPct val="0"/>
+              </a:spcAft>
+              <a:buClrTx/>
+              <a:buSzTx/>
+              <a:buFontTx/>
+              <a:buNone/>
+              <a:tabLst/>
+            </a:pPr>
+            <a:endParaRPr kumimoji="0" lang="en-US" sz="3600" b="0" i="0" u="none" strike="noStrike" cap="none" normalizeH="0" baseline="0" smtClean="0">
+              <a:ln>
+                <a:noFill/>
+              </a:ln>
+              <a:solidFill>
+                <a:schemeClr val="tx1"/>
+              </a:solidFill>
+              <a:effectLst/>
+              <a:latin typeface="Times New Roman" pitchFamily="8" charset="0"/>
             </a:endParaRPr>
           </a:p>
         </p:txBody>
@@ -21997,7 +22632,7 @@
                             </p:stCondLst>
                             <p:childTnLst>
                               <p:par>
-                                <p:cTn id="5" presetID="22" presetClass="entr" presetSubtype="8" fill="hold" nodeType="withEffect">
+                                <p:cTn id="5" presetID="22" presetClass="entr" presetSubtype="8" fill="hold" nodeType="afterEffect">
                                   <p:stCondLst>
                                     <p:cond delay="0"/>
                                   </p:stCondLst>
@@ -22010,7 +22645,7 @@
                                           </p:stCondLst>
                                         </p:cTn>
                                         <p:tgtEl>
-                                          <p:spTgt spid="6146"/>
+                                          <p:spTgt spid="4"/>
                                         </p:tgtEl>
                                         <p:attrNameLst>
                                           <p:attrName>style.visibility</p:attrName>
@@ -22024,7 +22659,51 @@
                                       <p:cBhvr>
                                         <p:cTn id="7" dur="500"/>
                                         <p:tgtEl>
-                                          <p:spTgt spid="6146"/>
+                                          <p:spTgt spid="4"/>
+                                        </p:tgtEl>
+                                      </p:cBhvr>
+                                    </p:animEffect>
+                                  </p:childTnLst>
+                                </p:cTn>
+                              </p:par>
+                            </p:childTnLst>
+                          </p:cTn>
+                        </p:par>
+                        <p:par>
+                          <p:cTn id="8" fill="hold">
+                            <p:stCondLst>
+                              <p:cond delay="500"/>
+                            </p:stCondLst>
+                            <p:childTnLst>
+                              <p:par>
+                                <p:cTn id="9" presetID="9" presetClass="entr" presetSubtype="0" fill="hold" grpId="0" nodeType="afterEffect">
+                                  <p:stCondLst>
+                                    <p:cond delay="0"/>
+                                  </p:stCondLst>
+                                  <p:childTnLst>
+                                    <p:set>
+                                      <p:cBhvr>
+                                        <p:cTn id="10" dur="1" fill="hold">
+                                          <p:stCondLst>
+                                            <p:cond delay="0"/>
+                                          </p:stCondLst>
+                                        </p:cTn>
+                                        <p:tgtEl>
+                                          <p:spTgt spid="2"/>
+                                        </p:tgtEl>
+                                        <p:attrNameLst>
+                                          <p:attrName>style.visibility</p:attrName>
+                                        </p:attrNameLst>
+                                      </p:cBhvr>
+                                      <p:to>
+                                        <p:strVal val="visible"/>
+                                      </p:to>
+                                    </p:set>
+                                    <p:animEffect transition="in" filter="dissolve">
+                                      <p:cBhvr>
+                                        <p:cTn id="11" dur="500"/>
+                                        <p:tgtEl>
+                                          <p:spTgt spid="2"/>
                                         </p:tgtEl>
                                       </p:cBhvr>
                                     </p:animEffect>
@@ -22058,6 +22737,9 @@
         </p:cTn>
       </p:par>
     </p:tnLst>
+    <p:bldLst>
+      <p:bldP spid="2" grpId="0" animBg="1"/>
+    </p:bldLst>
   </p:timing>
 </p:sld>
 </file>

</xml_diff>